<commit_message>
atualização com o quiz
</commit_message>
<xml_diff>
--- a/seminario_DEEP COMPRESSION/TP558_DEEP COMPRESSION.pptx
+++ b/seminario_DEEP COMPRESSION/TP558_DEEP COMPRESSION.pptx
@@ -5,10 +5,10 @@
     <p:sldMasterId id="2147483648" r:id="rId1"/>
   </p:sldMasterIdLst>
   <p:notesMasterIdLst>
-    <p:notesMasterId r:id="rId32"/>
+    <p:notesMasterId r:id="rId33"/>
   </p:notesMasterIdLst>
   <p:handoutMasterIdLst>
-    <p:handoutMasterId r:id="rId33"/>
+    <p:handoutMasterId r:id="rId34"/>
   </p:handoutMasterIdLst>
   <p:sldIdLst>
     <p:sldId id="256" r:id="rId2"/>
@@ -41,6 +41,7 @@
     <p:sldId id="339" r:id="rId29"/>
     <p:sldId id="341" r:id="rId30"/>
     <p:sldId id="306" r:id="rId31"/>
+    <p:sldId id="342" r:id="rId32"/>
   </p:sldIdLst>
   <p:sldSz cx="12192000" cy="6858000"/>
   <p:notesSz cx="7315200" cy="9601200"/>
@@ -2323,6 +2324,90 @@
     <p:extLst>
       <p:ext uri="{BB962C8B-B14F-4D97-AF65-F5344CB8AC3E}">
         <p14:creationId xmlns:p14="http://schemas.microsoft.com/office/powerpoint/2010/main" val="4021770217"/>
+      </p:ext>
+    </p:extLst>
+  </p:cSld>
+  <p:clrMapOvr>
+    <a:masterClrMapping/>
+  </p:clrMapOvr>
+</p:notes>
+</file>
+
+<file path=ppt/notesSlides/notesSlide27.xml><?xml version="1.0" encoding="utf-8"?>
+<p:notes xmlns:a="http://schemas.openxmlformats.org/drawingml/2006/main" xmlns:r="http://schemas.openxmlformats.org/officeDocument/2006/relationships" xmlns:p="http://schemas.openxmlformats.org/presentationml/2006/main">
+  <p:cSld>
+    <p:spTree>
+      <p:nvGrpSpPr>
+        <p:cNvPr id="1" name=""/>
+        <p:cNvGrpSpPr/>
+        <p:nvPr/>
+      </p:nvGrpSpPr>
+      <p:grpSpPr>
+        <a:xfrm>
+          <a:off x="0" y="0"/>
+          <a:ext cx="0" cy="0"/>
+          <a:chOff x="0" y="0"/>
+          <a:chExt cx="0" cy="0"/>
+        </a:xfrm>
+      </p:grpSpPr>
+      <p:sp>
+        <p:nvSpPr>
+          <p:cNvPr id="2" name="Espaço Reservado para Imagem de Slide 1"/>
+          <p:cNvSpPr>
+            <a:spLocks noGrp="1" noRot="1" noChangeAspect="1"/>
+          </p:cNvSpPr>
+          <p:nvPr>
+            <p:ph type="sldImg"/>
+          </p:nvPr>
+        </p:nvSpPr>
+        <p:spPr/>
+      </p:sp>
+      <p:sp>
+        <p:nvSpPr>
+          <p:cNvPr id="3" name="Espaço Reservado para Anotações 2"/>
+          <p:cNvSpPr>
+            <a:spLocks noGrp="1"/>
+          </p:cNvSpPr>
+          <p:nvPr>
+            <p:ph type="body" idx="1"/>
+          </p:nvPr>
+        </p:nvSpPr>
+        <p:spPr/>
+        <p:txBody>
+          <a:bodyPr/>
+          <a:lstStyle/>
+          <a:p>
+            <a:endParaRPr lang="pt-BR" dirty="0"/>
+          </a:p>
+        </p:txBody>
+      </p:sp>
+      <p:sp>
+        <p:nvSpPr>
+          <p:cNvPr id="4" name="Espaço Reservado para Número de Slide 3"/>
+          <p:cNvSpPr>
+            <a:spLocks noGrp="1"/>
+          </p:cNvSpPr>
+          <p:nvPr>
+            <p:ph type="sldNum" sz="quarter" idx="5"/>
+          </p:nvPr>
+        </p:nvSpPr>
+        <p:spPr/>
+        <p:txBody>
+          <a:bodyPr/>
+          <a:lstStyle/>
+          <a:p>
+            <a:fld id="{6FC8D850-966F-45A6-8DE7-15B891E7D40D}" type="slidenum">
+              <a:rPr lang="pt-BR" smtClean="0"/>
+              <a:t>31</a:t>
+            </a:fld>
+            <a:endParaRPr lang="pt-BR"/>
+          </a:p>
+        </p:txBody>
+      </p:sp>
+    </p:spTree>
+    <p:extLst>
+      <p:ext uri="{BB962C8B-B14F-4D97-AF65-F5344CB8AC3E}">
+        <p14:creationId xmlns:p14="http://schemas.microsoft.com/office/powerpoint/2010/main" val="856381749"/>
       </p:ext>
     </p:extLst>
   </p:cSld>
@@ -9689,6 +9774,107 @@
     <p:extLst>
       <p:ext uri="{BB962C8B-B14F-4D97-AF65-F5344CB8AC3E}">
         <p14:creationId xmlns:p14="http://schemas.microsoft.com/office/powerpoint/2010/main" val="2655704619"/>
+      </p:ext>
+    </p:extLst>
+  </p:cSld>
+  <p:clrMapOvr>
+    <a:masterClrMapping/>
+  </p:clrMapOvr>
+</p:sld>
+</file>
+
+<file path=ppt/slides/slide31.xml><?xml version="1.0" encoding="utf-8"?>
+<p:sld xmlns:a="http://schemas.openxmlformats.org/drawingml/2006/main" xmlns:r="http://schemas.openxmlformats.org/officeDocument/2006/relationships" xmlns:p="http://schemas.openxmlformats.org/presentationml/2006/main">
+  <p:cSld>
+    <p:spTree>
+      <p:nvGrpSpPr>
+        <p:cNvPr id="1" name=""/>
+        <p:cNvGrpSpPr/>
+        <p:nvPr/>
+      </p:nvGrpSpPr>
+      <p:grpSpPr>
+        <a:xfrm>
+          <a:off x="0" y="0"/>
+          <a:ext cx="0" cy="0"/>
+          <a:chOff x="0" y="0"/>
+          <a:chExt cx="0" cy="0"/>
+        </a:xfrm>
+      </p:grpSpPr>
+      <p:sp>
+        <p:nvSpPr>
+          <p:cNvPr id="2" name="Título 1">
+            <a:extLst>
+              <a:ext uri="{FF2B5EF4-FFF2-40B4-BE49-F238E27FC236}">
+                <a16:creationId xmlns:a16="http://schemas.microsoft.com/office/drawing/2014/main" id="{94AB8438-E56E-2412-517C-8456E4CA773C}"/>
+              </a:ext>
+            </a:extLst>
+          </p:cNvPr>
+          <p:cNvSpPr>
+            <a:spLocks noGrp="1"/>
+          </p:cNvSpPr>
+          <p:nvPr>
+            <p:ph type="title"/>
+          </p:nvPr>
+        </p:nvSpPr>
+        <p:spPr>
+          <a:xfrm>
+            <a:off x="838200" y="365125"/>
+            <a:ext cx="11201400" cy="1325563"/>
+          </a:xfrm>
+        </p:spPr>
+        <p:txBody>
+          <a:bodyPr/>
+          <a:lstStyle/>
+          <a:p>
+            <a:r>
+              <a:rPr lang="pt-BR" dirty="0"/>
+              <a:t>QUIZ</a:t>
+            </a:r>
+          </a:p>
+        </p:txBody>
+      </p:sp>
+      <p:sp>
+        <p:nvSpPr>
+          <p:cNvPr id="4" name="Espaço Reservado para Conteúdo 4">
+            <a:extLst>
+              <a:ext uri="{FF2B5EF4-FFF2-40B4-BE49-F238E27FC236}">
+                <a16:creationId xmlns:a16="http://schemas.microsoft.com/office/drawing/2014/main" id="{A04773E4-D017-03D4-CD98-EBCC547A9E54}"/>
+              </a:ext>
+            </a:extLst>
+          </p:cNvPr>
+          <p:cNvSpPr>
+            <a:spLocks noGrp="1"/>
+          </p:cNvSpPr>
+          <p:nvPr>
+            <p:ph idx="1"/>
+          </p:nvPr>
+        </p:nvSpPr>
+        <p:spPr>
+          <a:xfrm>
+            <a:off x="838200" y="1606062"/>
+            <a:ext cx="10515600" cy="4553195"/>
+          </a:xfrm>
+        </p:spPr>
+        <p:txBody>
+          <a:bodyPr>
+            <a:noAutofit/>
+          </a:bodyPr>
+          <a:lstStyle/>
+          <a:p>
+            <a:r>
+              <a:rPr lang="pt-BR" sz="2000" dirty="0">
+                <a:hlinkClick r:id="rId3"/>
+              </a:rPr>
+              <a:t>https://forms.gle/EXJodUTWsvJdTcaE7</a:t>
+            </a:r>
+            <a:endParaRPr lang="pt-BR" sz="2000" dirty="0"/>
+          </a:p>
+        </p:txBody>
+      </p:sp>
+    </p:spTree>
+    <p:extLst>
+      <p:ext uri="{BB962C8B-B14F-4D97-AF65-F5344CB8AC3E}">
+        <p14:creationId xmlns:p14="http://schemas.microsoft.com/office/powerpoint/2010/main" val="2881008313"/>
       </p:ext>
     </p:extLst>
   </p:cSld>

</xml_diff>